<commit_message>
updated diagram with UID2 colors
</commit_message>
<xml_diff>
--- a/docs/guides/images/resource/integration-mobile-client-server.pptx
+++ b/docs/guides/images/resource/integration-mobile-client-server.pptx
@@ -118,6 +118,7 @@
   <p188:author id="{62DE971E-C496-61EF-5331-13CC01DEEFA0}" name="Rita Aleksanyan" initials="RA" userId="S::rita.aleksanyan@thetradedesk.com::1693ac88-3169-4d9e-a847-f7a4d44f1ee4" providerId="AD"/>
   <p188:author id="{7CF6BA38-19B2-ADCA-398E-AAEA40211DA1}" name="Gen Whitt" initials="GW" userId="S::gen.whitt@thetradedesk.com::db30c609-a160-40fc-8663-1d2eed761b7c" providerId="AD"/>
   <p188:author id="{8035EE43-C981-B273-210E-160A21BB1C76}" name="Ian Bird" initials="IB" userId="S::ian.bird@thetradedesk.com::56122729-f2b9-4f78-8bd4-d42deaee1571" providerId="AD"/>
+  <p188:author id="{60053E6F-648C-B313-E5FC-68A90C662890}" name="Kristen Ruel" initials="KR" userId="S::kristen.ruel@thetradedesk.com::cf8d9084-4676-44b3-8491-2d2f321ae53e" providerId="AD"/>
   <p188:author id="{DCE742EE-89C5-151A-8DA9-FBC519FFEF36}" name="Sunny Wu" initials="SW" userId="S::sunny.wu@thetradedesk.com::f78c210d-0cec-4ee3-865b-fef61a8e240b" providerId="AD"/>
 </p188:authorLst>
 </file>
@@ -378,7 +379,7 @@
           <a:p>
             <a:fld id="{D86445D4-6ECA-DA4A-AA52-A98E106F9ACF}" type="datetimeFigureOut">
               <a:rPr lang="en-US" smtClean="0"/>
-              <a:t>5/8/2024</a:t>
+              <a:t>5/17/2024</a:t>
             </a:fld>
             <a:endParaRPr lang="en-US"/>
           </a:p>
@@ -576,7 +577,7 @@
           <a:p>
             <a:fld id="{D86445D4-6ECA-DA4A-AA52-A98E106F9ACF}" type="datetimeFigureOut">
               <a:rPr lang="en-US" smtClean="0"/>
-              <a:t>5/8/2024</a:t>
+              <a:t>5/17/2024</a:t>
             </a:fld>
             <a:endParaRPr lang="en-US"/>
           </a:p>
@@ -784,7 +785,7 @@
           <a:p>
             <a:fld id="{D86445D4-6ECA-DA4A-AA52-A98E106F9ACF}" type="datetimeFigureOut">
               <a:rPr lang="en-US" smtClean="0"/>
-              <a:t>5/8/2024</a:t>
+              <a:t>5/17/2024</a:t>
             </a:fld>
             <a:endParaRPr lang="en-US"/>
           </a:p>
@@ -982,7 +983,7 @@
           <a:p>
             <a:fld id="{D86445D4-6ECA-DA4A-AA52-A98E106F9ACF}" type="datetimeFigureOut">
               <a:rPr lang="en-US" smtClean="0"/>
-              <a:t>5/8/2024</a:t>
+              <a:t>5/17/2024</a:t>
             </a:fld>
             <a:endParaRPr lang="en-US"/>
           </a:p>
@@ -1257,7 +1258,7 @@
           <a:p>
             <a:fld id="{D86445D4-6ECA-DA4A-AA52-A98E106F9ACF}" type="datetimeFigureOut">
               <a:rPr lang="en-US" smtClean="0"/>
-              <a:t>5/8/2024</a:t>
+              <a:t>5/17/2024</a:t>
             </a:fld>
             <a:endParaRPr lang="en-US"/>
           </a:p>
@@ -1522,7 +1523,7 @@
           <a:p>
             <a:fld id="{D86445D4-6ECA-DA4A-AA52-A98E106F9ACF}" type="datetimeFigureOut">
               <a:rPr lang="en-US" smtClean="0"/>
-              <a:t>5/8/2024</a:t>
+              <a:t>5/17/2024</a:t>
             </a:fld>
             <a:endParaRPr lang="en-US"/>
           </a:p>
@@ -1934,7 +1935,7 @@
           <a:p>
             <a:fld id="{D86445D4-6ECA-DA4A-AA52-A98E106F9ACF}" type="datetimeFigureOut">
               <a:rPr lang="en-US" smtClean="0"/>
-              <a:t>5/8/2024</a:t>
+              <a:t>5/17/2024</a:t>
             </a:fld>
             <a:endParaRPr lang="en-US"/>
           </a:p>
@@ -2075,7 +2076,7 @@
           <a:p>
             <a:fld id="{D86445D4-6ECA-DA4A-AA52-A98E106F9ACF}" type="datetimeFigureOut">
               <a:rPr lang="en-US" smtClean="0"/>
-              <a:t>5/8/2024</a:t>
+              <a:t>5/17/2024</a:t>
             </a:fld>
             <a:endParaRPr lang="en-US"/>
           </a:p>
@@ -2188,7 +2189,7 @@
           <a:p>
             <a:fld id="{D86445D4-6ECA-DA4A-AA52-A98E106F9ACF}" type="datetimeFigureOut">
               <a:rPr lang="en-US" smtClean="0"/>
-              <a:t>5/8/2024</a:t>
+              <a:t>5/17/2024</a:t>
             </a:fld>
             <a:endParaRPr lang="en-US"/>
           </a:p>
@@ -2499,7 +2500,7 @@
           <a:p>
             <a:fld id="{D86445D4-6ECA-DA4A-AA52-A98E106F9ACF}" type="datetimeFigureOut">
               <a:rPr lang="en-US" smtClean="0"/>
-              <a:t>5/8/2024</a:t>
+              <a:t>5/17/2024</a:t>
             </a:fld>
             <a:endParaRPr lang="en-US"/>
           </a:p>
@@ -2787,7 +2788,7 @@
           <a:p>
             <a:fld id="{D86445D4-6ECA-DA4A-AA52-A98E106F9ACF}" type="datetimeFigureOut">
               <a:rPr lang="en-US" smtClean="0"/>
-              <a:t>5/8/2024</a:t>
+              <a:t>5/17/2024</a:t>
             </a:fld>
             <a:endParaRPr lang="en-US"/>
           </a:p>
@@ -3028,7 +3029,7 @@
           <a:p>
             <a:fld id="{D86445D4-6ECA-DA4A-AA52-A98E106F9ACF}" type="datetimeFigureOut">
               <a:rPr lang="en-US" smtClean="0"/>
-              <a:t>5/8/2024</a:t>
+              <a:t>5/17/2024</a:t>
             </a:fld>
             <a:endParaRPr lang="en-US"/>
           </a:p>
@@ -3468,7 +3469,7 @@
             </a:avLst>
           </a:prstGeom>
           <a:solidFill>
-            <a:srgbClr val="0099FA"/>
+            <a:srgbClr val="78CC00"/>
           </a:solidFill>
         </p:spPr>
         <p:style>
@@ -3815,7 +3816,7 @@
             </a:avLst>
           </a:prstGeom>
           <a:solidFill>
-            <a:srgbClr val="0099FA"/>
+            <a:srgbClr val="78CC00"/>
           </a:solidFill>
         </p:spPr>
         <p:style>
@@ -3846,7 +3847,7 @@
           <a:bodyPr/>
           <a:lstStyle/>
           <a:p>
-            <a:endParaRPr lang="en-US"/>
+            <a:endParaRPr lang="en-US" dirty="0"/>
           </a:p>
         </p:txBody>
       </p:sp>
@@ -4324,7 +4325,7 @@
             </a:avLst>
           </a:prstGeom>
           <a:solidFill>
-            <a:srgbClr val="FFCE00"/>
+            <a:srgbClr val="1BD2DE"/>
           </a:solidFill>
         </p:spPr>
         <p:style>
@@ -4355,7 +4356,7 @@
           <a:bodyPr/>
           <a:lstStyle/>
           <a:p>
-            <a:endParaRPr lang="en-US">
+            <a:endParaRPr lang="en-US" dirty="0">
               <a:solidFill>
                 <a:schemeClr val="bg1"/>
               </a:solidFill>
@@ -4857,7 +4858,7 @@
               </a:avLst>
             </a:prstGeom>
             <a:solidFill>
-              <a:srgbClr val="0099FA"/>
+              <a:srgbClr val="78CC00"/>
             </a:solidFill>
           </p:spPr>
           <p:style>
@@ -4888,7 +4889,7 @@
             <a:bodyPr lIns="91440" tIns="45720" rIns="91440" bIns="45720" anchor="t"/>
             <a:lstStyle/>
             <a:p>
-              <a:endParaRPr lang="en-US">
+              <a:endParaRPr lang="en-US" dirty="0">
                 <a:ea typeface="Calibri"/>
                 <a:cs typeface="Calibri"/>
               </a:endParaRPr>
@@ -5660,7 +5661,7 @@
               </a:avLst>
             </a:prstGeom>
             <a:solidFill>
-              <a:srgbClr val="FFCE00"/>
+              <a:srgbClr val="1BD2DE"/>
             </a:solidFill>
           </p:spPr>
           <p:style>
@@ -5691,7 +5692,7 @@
             <a:bodyPr/>
             <a:lstStyle/>
             <a:p>
-              <a:endParaRPr lang="en-US">
+              <a:endParaRPr lang="en-US" dirty="0">
                 <a:solidFill>
                   <a:schemeClr val="bg1"/>
                 </a:solidFill>
@@ -6113,7 +6114,7 @@
             </a:avLst>
           </a:prstGeom>
           <a:solidFill>
-            <a:srgbClr val="FF7B00"/>
+            <a:srgbClr val="7085D4"/>
           </a:solidFill>
         </p:spPr>
         <p:style>
@@ -6144,7 +6145,7 @@
           <a:bodyPr/>
           <a:lstStyle/>
           <a:p>
-            <a:endParaRPr lang="en-US">
+            <a:endParaRPr lang="en-US" dirty="0">
               <a:solidFill>
                 <a:schemeClr val="bg1"/>
               </a:solidFill>
@@ -6814,7 +6815,7 @@
             </a:avLst>
           </a:prstGeom>
           <a:solidFill>
-            <a:srgbClr val="FF7B00"/>
+            <a:srgbClr val="7085D4"/>
           </a:solidFill>
         </p:spPr>
         <p:style>
@@ -7545,6 +7546,38 @@
               </a:rPr>
               <a:t>11</a:t>
             </a:r>
+          </a:p>
+        </p:txBody>
+      </p:sp>
+      <p:sp>
+        <p:nvSpPr>
+          <p:cNvPr id="12" name="TextBox 11">
+            <a:extLst>
+              <a:ext uri="{FF2B5EF4-FFF2-40B4-BE49-F238E27FC236}">
+                <a16:creationId xmlns:a16="http://schemas.microsoft.com/office/drawing/2014/main" id="{D64CF9A1-97F5-266E-8854-04E8369EEB52}"/>
+              </a:ext>
+            </a:extLst>
+          </p:cNvPr>
+          <p:cNvSpPr txBox="1"/>
+          <p:nvPr/>
+        </p:nvSpPr>
+        <p:spPr>
+          <a:xfrm>
+            <a:off x="3954162" y="3275226"/>
+            <a:ext cx="7908324" cy="369332"/>
+          </a:xfrm>
+          <a:prstGeom prst="rect">
+            <a:avLst/>
+          </a:prstGeom>
+          <a:noFill/>
+        </p:spPr>
+        <p:txBody>
+          <a:bodyPr wrap="square">
+            <a:spAutoFit/>
+          </a:bodyPr>
+          <a:lstStyle/>
+          <a:p>
+            <a:endParaRPr lang="en-US" dirty="0"/>
           </a:p>
         </p:txBody>
       </p:sp>
@@ -7610,7 +7643,7 @@
         <p:spPr>
           <a:xfrm>
             <a:off x="1765300" y="984250"/>
-            <a:ext cx="9023350" cy="1754326"/>
+            <a:ext cx="9023350" cy="2308324"/>
           </a:xfrm>
           <a:prstGeom prst="rect">
             <a:avLst/>
@@ -7634,6 +7667,20 @@
               <a:rPr lang="en-US" dirty="0"/>
               <a:t>https://ttdcorp-my.sharepoint.com/:p:/r/personal/rita_aleksanyan_thetradedesk_com/_layouts/15/Doc.aspx?sourcedoc=%7BDF894943-3D6A-4A60-A1E2-176ACD0BBBCC%7D&amp;file=Sample%20Data%20Flow.pptx&amp;wdLOR=c8FEF9DB2-E2FD-4F07-B411-B094C4813ACE&amp;fromShare=true&amp;action=edit&amp;mobileredirect=true </a:t>
             </a:r>
+          </a:p>
+          <a:p>
+            <a:endParaRPr lang="en-US" dirty="0"/>
+          </a:p>
+          <a:p>
+            <a:r>
+              <a:rPr lang="en-US" dirty="0"/>
+              <a:t>Update 5/17/24: this is now the diagram source since the colors </a:t>
+            </a:r>
+            <a:r>
+              <a:rPr lang="en-US"/>
+              <a:t>were updated.</a:t>
+            </a:r>
+            <a:endParaRPr lang="en-US" dirty="0"/>
           </a:p>
         </p:txBody>
       </p:sp>

</xml_diff>